<commit_message>
Working on Lecture 5
Signed-off-by: andrewt0301 <andrewt0301@gmail.com>
</commit_message>
<xml_diff>
--- a/docs/part1ca/05_MacrosBranchesArrays/CA_Lecture_05.pptx
+++ b/docs/part1ca/05_MacrosBranchesArrays/CA_Lecture_05.pptx
@@ -17175,21 +17175,8 @@
                   <a:srgbClr val="00B050"/>
                 </a:solidFill>
               </a:rPr>
-              <a:t>"Hello, world</a:t>
-            </a:r>
-            <a:r>
-              <a:rPr lang="en-US" sz="3600" dirty="0" smtClean="0">
-                <a:solidFill>
-                  <a:srgbClr val="00B050"/>
-                </a:solidFill>
-              </a:rPr>
-              <a:t>!"</a:t>
-            </a:r>
-            <a:endParaRPr lang="en-US" sz="3600" dirty="0" smtClean="0">
-              <a:solidFill>
-                <a:srgbClr val="00B050"/>
-              </a:solidFill>
-            </a:endParaRPr>
+              <a:t>"Hello, world!"</a:t>
+            </a:r>
           </a:p>
           <a:p>
             <a:pPr>
@@ -19296,9 +19283,16 @@
             <p:ph idx="1"/>
           </p:nvPr>
         </p:nvSpPr>
-        <p:spPr/>
-        <p:txBody>
-          <a:bodyPr/>
+        <p:spPr>
+          <a:xfrm>
+            <a:off x="838200" y="1178053"/>
+            <a:ext cx="10515600" cy="5492304"/>
+          </a:xfrm>
+        </p:spPr>
+        <p:txBody>
+          <a:bodyPr>
+            <a:normAutofit fontScale="55000" lnSpcReduction="20000"/>
+          </a:bodyPr>
           <a:lstStyle/>
           <a:p>
             <a:pPr marL="0" indent="0" algn="ctr">
@@ -19308,28 +19302,256 @@
               <a:buNone/>
             </a:pPr>
             <a:r>
-              <a:rPr lang="en-US" b="1" dirty="0" smtClean="0"/>
+              <a:rPr lang="en-US" sz="6500" b="1" dirty="0" smtClean="0"/>
               <a:t>Branch </a:t>
             </a:r>
             <a:r>
-              <a:rPr lang="en-US" b="1" dirty="0" err="1" smtClean="0"/>
+              <a:rPr lang="en-US" sz="6500" b="1" dirty="0" err="1" smtClean="0"/>
               <a:t>Pseudoinstructions</a:t>
             </a:r>
           </a:p>
           <a:p>
             <a:pPr>
               <a:lnSpc>
-                <a:spcPct val="100000"/>
+                <a:spcPct val="110000"/>
               </a:lnSpc>
               <a:spcBef>
-                <a:spcPts val="600"/>
+                <a:spcPts val="0"/>
               </a:spcBef>
             </a:pPr>
             <a:r>
-              <a:rPr lang="en-US" smtClean="0"/>
-              <a:t>TODO</a:t>
-            </a:r>
-            <a:endParaRPr lang="en-US" i="1" dirty="0"/>
+              <a:rPr lang="en-US" sz="5800" dirty="0"/>
+              <a:t>Branch unconditionally  b        label</a:t>
+            </a:r>
+          </a:p>
+          <a:p>
+            <a:pPr>
+              <a:lnSpc>
+                <a:spcPct val="110000"/>
+              </a:lnSpc>
+              <a:spcBef>
+                <a:spcPts val="0"/>
+              </a:spcBef>
+            </a:pPr>
+            <a:r>
+              <a:rPr lang="en-US" sz="5800" dirty="0"/>
+              <a:t>Branch = 0              </a:t>
+            </a:r>
+            <a:r>
+              <a:rPr lang="en-US" sz="5800" dirty="0" err="1"/>
+              <a:t>beqz</a:t>
+            </a:r>
+            <a:r>
+              <a:rPr lang="en-US" sz="5800" dirty="0"/>
+              <a:t> t1, label</a:t>
+            </a:r>
+          </a:p>
+          <a:p>
+            <a:pPr>
+              <a:lnSpc>
+                <a:spcPct val="110000"/>
+              </a:lnSpc>
+              <a:spcBef>
+                <a:spcPts val="0"/>
+              </a:spcBef>
+            </a:pPr>
+            <a:r>
+              <a:rPr lang="en-US" sz="5800" dirty="0"/>
+              <a:t>Branch ≥ 0              </a:t>
+            </a:r>
+            <a:r>
+              <a:rPr lang="en-US" sz="5800" dirty="0" err="1"/>
+              <a:t>bgez</a:t>
+            </a:r>
+            <a:r>
+              <a:rPr lang="en-US" sz="5800" dirty="0"/>
+              <a:t> t1, label</a:t>
+            </a:r>
+          </a:p>
+          <a:p>
+            <a:pPr>
+              <a:lnSpc>
+                <a:spcPct val="110000"/>
+              </a:lnSpc>
+              <a:spcBef>
+                <a:spcPts val="0"/>
+              </a:spcBef>
+            </a:pPr>
+            <a:r>
+              <a:rPr lang="en-US" sz="5800" dirty="0"/>
+              <a:t>Branch &gt;               </a:t>
+            </a:r>
+            <a:r>
+              <a:rPr lang="ru-RU" sz="5800" smtClean="0"/>
+              <a:t>        </a:t>
+            </a:r>
+            <a:r>
+              <a:rPr lang="en-US" sz="5800" smtClean="0"/>
+              <a:t> </a:t>
+            </a:r>
+            <a:r>
+              <a:rPr lang="en-US" sz="5800" dirty="0" err="1"/>
+              <a:t>bgt</a:t>
+            </a:r>
+            <a:r>
+              <a:rPr lang="en-US" sz="5800" dirty="0"/>
+              <a:t>  t1, t2, label</a:t>
+            </a:r>
+          </a:p>
+          <a:p>
+            <a:pPr>
+              <a:lnSpc>
+                <a:spcPct val="110000"/>
+              </a:lnSpc>
+              <a:spcBef>
+                <a:spcPts val="0"/>
+              </a:spcBef>
+            </a:pPr>
+            <a:r>
+              <a:rPr lang="en-US" sz="5800" dirty="0"/>
+              <a:t>Branch &gt; Unsigned       </a:t>
+            </a:r>
+            <a:r>
+              <a:rPr lang="en-US" sz="5800" dirty="0" err="1"/>
+              <a:t>bgtu</a:t>
+            </a:r>
+            <a:r>
+              <a:rPr lang="en-US" sz="5800" dirty="0"/>
+              <a:t> t1, t2, label</a:t>
+            </a:r>
+          </a:p>
+          <a:p>
+            <a:pPr>
+              <a:lnSpc>
+                <a:spcPct val="110000"/>
+              </a:lnSpc>
+              <a:spcBef>
+                <a:spcPts val="0"/>
+              </a:spcBef>
+            </a:pPr>
+            <a:r>
+              <a:rPr lang="en-US" sz="5800" dirty="0"/>
+              <a:t>Branch &gt; 0             </a:t>
+            </a:r>
+            <a:r>
+              <a:rPr lang="ru-RU" sz="5800" dirty="0" smtClean="0"/>
+              <a:t>       </a:t>
+            </a:r>
+            <a:r>
+              <a:rPr lang="en-US" sz="5800" dirty="0" smtClean="0"/>
+              <a:t> </a:t>
+            </a:r>
+            <a:r>
+              <a:rPr lang="en-US" sz="5800" dirty="0" err="1"/>
+              <a:t>bgtz</a:t>
+            </a:r>
+            <a:r>
+              <a:rPr lang="en-US" sz="5800" dirty="0"/>
+              <a:t> t1, label</a:t>
+            </a:r>
+          </a:p>
+          <a:p>
+            <a:pPr>
+              <a:lnSpc>
+                <a:spcPct val="110000"/>
+              </a:lnSpc>
+              <a:spcBef>
+                <a:spcPts val="0"/>
+              </a:spcBef>
+            </a:pPr>
+            <a:r>
+              <a:rPr lang="en-US" sz="5800" dirty="0"/>
+              <a:t>Branch ≤                </a:t>
+            </a:r>
+            <a:r>
+              <a:rPr lang="en-US" sz="5800" dirty="0" err="1"/>
+              <a:t>ble</a:t>
+            </a:r>
+            <a:r>
+              <a:rPr lang="en-US" sz="5800" dirty="0"/>
+              <a:t>  t1, t2, label</a:t>
+            </a:r>
+          </a:p>
+          <a:p>
+            <a:pPr>
+              <a:lnSpc>
+                <a:spcPct val="110000"/>
+              </a:lnSpc>
+              <a:spcBef>
+                <a:spcPts val="0"/>
+              </a:spcBef>
+            </a:pPr>
+            <a:r>
+              <a:rPr lang="en-US" sz="5800" dirty="0"/>
+              <a:t>Branch ≤ Unsigned       bleu t1, t2, label</a:t>
+            </a:r>
+          </a:p>
+          <a:p>
+            <a:pPr>
+              <a:lnSpc>
+                <a:spcPct val="110000"/>
+              </a:lnSpc>
+              <a:spcBef>
+                <a:spcPts val="0"/>
+              </a:spcBef>
+            </a:pPr>
+            <a:r>
+              <a:rPr lang="en-US" sz="5800" dirty="0"/>
+              <a:t>Branch ≤ 0              </a:t>
+            </a:r>
+            <a:r>
+              <a:rPr lang="en-US" sz="5800" dirty="0" err="1"/>
+              <a:t>blez</a:t>
+            </a:r>
+            <a:r>
+              <a:rPr lang="en-US" sz="5800" dirty="0"/>
+              <a:t> t1, label</a:t>
+            </a:r>
+          </a:p>
+          <a:p>
+            <a:pPr>
+              <a:lnSpc>
+                <a:spcPct val="110000"/>
+              </a:lnSpc>
+              <a:spcBef>
+                <a:spcPts val="0"/>
+              </a:spcBef>
+            </a:pPr>
+            <a:r>
+              <a:rPr lang="en-US" sz="5800" dirty="0"/>
+              <a:t>Branch &lt; 0              </a:t>
+            </a:r>
+            <a:r>
+              <a:rPr lang="en-US" sz="5800" dirty="0" err="1"/>
+              <a:t>bltz</a:t>
+            </a:r>
+            <a:r>
+              <a:rPr lang="en-US" sz="5800" dirty="0"/>
+              <a:t> t1, label</a:t>
+            </a:r>
+          </a:p>
+          <a:p>
+            <a:pPr>
+              <a:lnSpc>
+                <a:spcPct val="110000"/>
+              </a:lnSpc>
+              <a:spcBef>
+                <a:spcPts val="0"/>
+              </a:spcBef>
+            </a:pPr>
+            <a:r>
+              <a:rPr lang="en-US" sz="5800" dirty="0"/>
+              <a:t>Branch ≠ 0              </a:t>
+            </a:r>
+            <a:r>
+              <a:rPr lang="en-US" sz="5800" dirty="0" err="1"/>
+              <a:t>bnez</a:t>
+            </a:r>
+            <a:r>
+              <a:rPr lang="en-US" sz="5800" dirty="0"/>
+              <a:t> t1, label</a:t>
+            </a:r>
+            <a:endParaRPr lang="en-US" sz="5800" i="1" dirty="0"/>
           </a:p>
         </p:txBody>
       </p:sp>

</xml_diff>